<commit_message>
Changed 'baseline model' to 'probability model'
</commit_message>
<xml_diff>
--- a/problem_statement/KW-cp6-poster-draft.pptx
+++ b/problem_statement/KW-cp6-poster-draft.pptx
@@ -289,7 +289,7 @@
             <a:fld id="{91E52B59-04F6-C14B-88DF-2A7E1C5088F2}" type="datetimeFigureOut">
               <a:rPr lang="en-US" smtClean="0"/>
               <a:pPr/>
-              <a:t>7/5/2015</a:t>
+              <a:t>7/6/2015</a:t>
             </a:fld>
             <a:endParaRPr lang="en-US"/>
           </a:p>
@@ -341,7 +341,7 @@
     </p:spTree>
     <p:extLst>
       <p:ext uri="{BB962C8B-B14F-4D97-AF65-F5344CB8AC3E}">
-        <p14:creationId xmlns:p14="http://schemas.microsoft.com/office/powerpoint/2010/main" xmlns="" val="3284330639"/>
+        <p14:creationId xmlns="" xmlns:p14="http://schemas.microsoft.com/office/powerpoint/2010/main" val="3284330639"/>
       </p:ext>
     </p:extLst>
   </p:cSld>
@@ -461,7 +461,7 @@
             <a:fld id="{91E52B59-04F6-C14B-88DF-2A7E1C5088F2}" type="datetimeFigureOut">
               <a:rPr lang="en-US" smtClean="0"/>
               <a:pPr/>
-              <a:t>7/5/2015</a:t>
+              <a:t>7/6/2015</a:t>
             </a:fld>
             <a:endParaRPr lang="en-US"/>
           </a:p>
@@ -513,7 +513,7 @@
     </p:spTree>
     <p:extLst>
       <p:ext uri="{BB962C8B-B14F-4D97-AF65-F5344CB8AC3E}">
-        <p14:creationId xmlns:p14="http://schemas.microsoft.com/office/powerpoint/2010/main" xmlns="" val="2028544917"/>
+        <p14:creationId xmlns="" xmlns:p14="http://schemas.microsoft.com/office/powerpoint/2010/main" val="2028544917"/>
       </p:ext>
     </p:extLst>
   </p:cSld>
@@ -643,7 +643,7 @@
             <a:fld id="{91E52B59-04F6-C14B-88DF-2A7E1C5088F2}" type="datetimeFigureOut">
               <a:rPr lang="en-US" smtClean="0"/>
               <a:pPr/>
-              <a:t>7/5/2015</a:t>
+              <a:t>7/6/2015</a:t>
             </a:fld>
             <a:endParaRPr lang="en-US"/>
           </a:p>
@@ -695,7 +695,7 @@
     </p:spTree>
     <p:extLst>
       <p:ext uri="{BB962C8B-B14F-4D97-AF65-F5344CB8AC3E}">
-        <p14:creationId xmlns:p14="http://schemas.microsoft.com/office/powerpoint/2010/main" xmlns="" val="3000910633"/>
+        <p14:creationId xmlns="" xmlns:p14="http://schemas.microsoft.com/office/powerpoint/2010/main" val="3000910633"/>
       </p:ext>
     </p:extLst>
   </p:cSld>
@@ -815,7 +815,7 @@
             <a:fld id="{91E52B59-04F6-C14B-88DF-2A7E1C5088F2}" type="datetimeFigureOut">
               <a:rPr lang="en-US" smtClean="0"/>
               <a:pPr/>
-              <a:t>7/5/2015</a:t>
+              <a:t>7/6/2015</a:t>
             </a:fld>
             <a:endParaRPr lang="en-US"/>
           </a:p>
@@ -867,7 +867,7 @@
     </p:spTree>
     <p:extLst>
       <p:ext uri="{BB962C8B-B14F-4D97-AF65-F5344CB8AC3E}">
-        <p14:creationId xmlns:p14="http://schemas.microsoft.com/office/powerpoint/2010/main" xmlns="" val="3688294867"/>
+        <p14:creationId xmlns="" xmlns:p14="http://schemas.microsoft.com/office/powerpoint/2010/main" val="3688294867"/>
       </p:ext>
     </p:extLst>
   </p:cSld>
@@ -1063,7 +1063,7 @@
             <a:fld id="{91E52B59-04F6-C14B-88DF-2A7E1C5088F2}" type="datetimeFigureOut">
               <a:rPr lang="en-US" smtClean="0"/>
               <a:pPr/>
-              <a:t>7/5/2015</a:t>
+              <a:t>7/6/2015</a:t>
             </a:fld>
             <a:endParaRPr lang="en-US"/>
           </a:p>
@@ -1115,7 +1115,7 @@
     </p:spTree>
     <p:extLst>
       <p:ext uri="{BB962C8B-B14F-4D97-AF65-F5344CB8AC3E}">
-        <p14:creationId xmlns:p14="http://schemas.microsoft.com/office/powerpoint/2010/main" xmlns="" val="2957209384"/>
+        <p14:creationId xmlns="" xmlns:p14="http://schemas.microsoft.com/office/powerpoint/2010/main" val="2957209384"/>
       </p:ext>
     </p:extLst>
   </p:cSld>
@@ -1353,7 +1353,7 @@
             <a:fld id="{91E52B59-04F6-C14B-88DF-2A7E1C5088F2}" type="datetimeFigureOut">
               <a:rPr lang="en-US" smtClean="0"/>
               <a:pPr/>
-              <a:t>7/5/2015</a:t>
+              <a:t>7/6/2015</a:t>
             </a:fld>
             <a:endParaRPr lang="en-US"/>
           </a:p>
@@ -1405,7 +1405,7 @@
     </p:spTree>
     <p:extLst>
       <p:ext uri="{BB962C8B-B14F-4D97-AF65-F5344CB8AC3E}">
-        <p14:creationId xmlns:p14="http://schemas.microsoft.com/office/powerpoint/2010/main" xmlns="" val="4125405752"/>
+        <p14:creationId xmlns="" xmlns:p14="http://schemas.microsoft.com/office/powerpoint/2010/main" val="4125405752"/>
       </p:ext>
     </p:extLst>
   </p:cSld>
@@ -1777,7 +1777,7 @@
             <a:fld id="{91E52B59-04F6-C14B-88DF-2A7E1C5088F2}" type="datetimeFigureOut">
               <a:rPr lang="en-US" smtClean="0"/>
               <a:pPr/>
-              <a:t>7/5/2015</a:t>
+              <a:t>7/6/2015</a:t>
             </a:fld>
             <a:endParaRPr lang="en-US"/>
           </a:p>
@@ -1829,7 +1829,7 @@
     </p:spTree>
     <p:extLst>
       <p:ext uri="{BB962C8B-B14F-4D97-AF65-F5344CB8AC3E}">
-        <p14:creationId xmlns:p14="http://schemas.microsoft.com/office/powerpoint/2010/main" xmlns="" val="2945653664"/>
+        <p14:creationId xmlns="" xmlns:p14="http://schemas.microsoft.com/office/powerpoint/2010/main" val="2945653664"/>
       </p:ext>
     </p:extLst>
   </p:cSld>
@@ -1897,7 +1897,7 @@
             <a:fld id="{91E52B59-04F6-C14B-88DF-2A7E1C5088F2}" type="datetimeFigureOut">
               <a:rPr lang="en-US" smtClean="0"/>
               <a:pPr/>
-              <a:t>7/5/2015</a:t>
+              <a:t>7/6/2015</a:t>
             </a:fld>
             <a:endParaRPr lang="en-US"/>
           </a:p>
@@ -1949,7 +1949,7 @@
     </p:spTree>
     <p:extLst>
       <p:ext uri="{BB962C8B-B14F-4D97-AF65-F5344CB8AC3E}">
-        <p14:creationId xmlns:p14="http://schemas.microsoft.com/office/powerpoint/2010/main" xmlns="" val="4207284367"/>
+        <p14:creationId xmlns="" xmlns:p14="http://schemas.microsoft.com/office/powerpoint/2010/main" val="4207284367"/>
       </p:ext>
     </p:extLst>
   </p:cSld>
@@ -1994,7 +1994,7 @@
             <a:fld id="{91E52B59-04F6-C14B-88DF-2A7E1C5088F2}" type="datetimeFigureOut">
               <a:rPr lang="en-US" smtClean="0"/>
               <a:pPr/>
-              <a:t>7/5/2015</a:t>
+              <a:t>7/6/2015</a:t>
             </a:fld>
             <a:endParaRPr lang="en-US"/>
           </a:p>
@@ -2046,7 +2046,7 @@
     </p:spTree>
     <p:extLst>
       <p:ext uri="{BB962C8B-B14F-4D97-AF65-F5344CB8AC3E}">
-        <p14:creationId xmlns:p14="http://schemas.microsoft.com/office/powerpoint/2010/main" xmlns="" val="1962708010"/>
+        <p14:creationId xmlns="" xmlns:p14="http://schemas.microsoft.com/office/powerpoint/2010/main" val="1962708010"/>
       </p:ext>
     </p:extLst>
   </p:cSld>
@@ -2273,7 +2273,7 @@
             <a:fld id="{91E52B59-04F6-C14B-88DF-2A7E1C5088F2}" type="datetimeFigureOut">
               <a:rPr lang="en-US" smtClean="0"/>
               <a:pPr/>
-              <a:t>7/5/2015</a:t>
+              <a:t>7/6/2015</a:t>
             </a:fld>
             <a:endParaRPr lang="en-US"/>
           </a:p>
@@ -2325,7 +2325,7 @@
     </p:spTree>
     <p:extLst>
       <p:ext uri="{BB962C8B-B14F-4D97-AF65-F5344CB8AC3E}">
-        <p14:creationId xmlns:p14="http://schemas.microsoft.com/office/powerpoint/2010/main" xmlns="" val="1293177147"/>
+        <p14:creationId xmlns="" xmlns:p14="http://schemas.microsoft.com/office/powerpoint/2010/main" val="1293177147"/>
       </p:ext>
     </p:extLst>
   </p:cSld>
@@ -2528,7 +2528,7 @@
             <a:fld id="{91E52B59-04F6-C14B-88DF-2A7E1C5088F2}" type="datetimeFigureOut">
               <a:rPr lang="en-US" smtClean="0"/>
               <a:pPr/>
-              <a:t>7/5/2015</a:t>
+              <a:t>7/6/2015</a:t>
             </a:fld>
             <a:endParaRPr lang="en-US"/>
           </a:p>
@@ -2580,7 +2580,7 @@
     </p:spTree>
     <p:extLst>
       <p:ext uri="{BB962C8B-B14F-4D97-AF65-F5344CB8AC3E}">
-        <p14:creationId xmlns:p14="http://schemas.microsoft.com/office/powerpoint/2010/main" xmlns="" val="1720763215"/>
+        <p14:creationId xmlns="" xmlns:p14="http://schemas.microsoft.com/office/powerpoint/2010/main" val="1720763215"/>
       </p:ext>
     </p:extLst>
   </p:cSld>
@@ -2743,7 +2743,7 @@
             <a:fld id="{91E52B59-04F6-C14B-88DF-2A7E1C5088F2}" type="datetimeFigureOut">
               <a:rPr lang="en-US" smtClean="0"/>
               <a:pPr/>
-              <a:t>7/5/2015</a:t>
+              <a:t>7/6/2015</a:t>
             </a:fld>
             <a:endParaRPr lang="en-US"/>
           </a:p>
@@ -2831,7 +2831,7 @@
     </p:spTree>
     <p:extLst>
       <p:ext uri="{BB962C8B-B14F-4D97-AF65-F5344CB8AC3E}">
-        <p14:creationId xmlns:p14="http://schemas.microsoft.com/office/powerpoint/2010/main" xmlns="" val="761185042"/>
+        <p14:creationId xmlns="" xmlns:p14="http://schemas.microsoft.com/office/powerpoint/2010/main" val="761185042"/>
       </p:ext>
     </p:extLst>
   </p:cSld>
@@ -3311,11 +3311,7 @@
             </a:pPr>
             <a:r>
               <a:rPr lang="en-US" sz="3200" dirty="0" smtClean="0"/>
-              <a:t>The challenge problem is </a:t>
-            </a:r>
-            <a:r>
-              <a:rPr lang="en-US" sz="3200" dirty="0" smtClean="0"/>
-              <a:t>to </a:t>
+              <a:t>The challenge problem is to </a:t>
             </a:r>
             <a:r>
               <a:rPr lang="en-US" sz="3200" b="1" dirty="0" smtClean="0"/>
@@ -3393,15 +3389,7 @@
             </a:pPr>
             <a:r>
               <a:rPr lang="en-US" sz="3200" dirty="0" smtClean="0"/>
-              <a:t>The photo’s EXIF time </a:t>
-            </a:r>
-            <a:r>
-              <a:rPr lang="en-US" sz="3200" dirty="0" smtClean="0"/>
-              <a:t>/ date, whether flash was </a:t>
-            </a:r>
-            <a:r>
-              <a:rPr lang="en-US" sz="3200" dirty="0" smtClean="0"/>
-              <a:t>used</a:t>
+              <a:t>The photo’s EXIF time / date, whether flash was used</a:t>
             </a:r>
           </a:p>
           <a:p>
@@ -3443,11 +3431,7 @@
             </a:r>
             <a:r>
               <a:rPr lang="en-US" sz="3200" dirty="0" err="1" smtClean="0"/>
-              <a:t>F</a:t>
-            </a:r>
-            <a:r>
-              <a:rPr lang="en-US" sz="3200" dirty="0" err="1" smtClean="0"/>
-              <a:t>lickr</a:t>
+              <a:t>Flickr</a:t>
             </a:r>
             <a:r>
               <a:rPr lang="en-US" sz="3200" dirty="0" smtClean="0"/>
@@ -3502,11 +3486,7 @@
           <a:p>
             <a:r>
               <a:rPr lang="en-US" sz="6000" b="1" u="sng" dirty="0" smtClean="0"/>
-              <a:t>Testing and Evaluation </a:t>
-            </a:r>
-            <a:r>
-              <a:rPr lang="en-US" sz="6000" b="1" u="sng" dirty="0" smtClean="0"/>
-              <a:t>Plan</a:t>
+              <a:t>Testing and Evaluation Plan</a:t>
             </a:r>
           </a:p>
         </p:txBody>
@@ -3599,15 +3579,7 @@
             </a:pPr>
             <a:r>
               <a:rPr lang="en-US" sz="3200" dirty="0" smtClean="0"/>
-              <a:t>Intrinsic, image feature, and relational</a:t>
-            </a:r>
-            <a:r>
-              <a:rPr lang="en-US" sz="3200" dirty="0" smtClean="0"/>
-              <a:t> </a:t>
-            </a:r>
-            <a:r>
-              <a:rPr lang="en-US" sz="3200" dirty="0" smtClean="0"/>
-              <a:t>data provided as flat files</a:t>
+              <a:t>Intrinsic, image feature, and relational data provided as flat files</a:t>
             </a:r>
           </a:p>
           <a:p>
@@ -3617,17 +3589,8 @@
             </a:pPr>
             <a:r>
               <a:rPr lang="en-US" sz="3200" dirty="0" smtClean="0"/>
-              <a:t>Images available, but no performer image processing </a:t>
-            </a:r>
-            <a:r>
-              <a:rPr lang="en-US" sz="3200" dirty="0" smtClean="0"/>
-              <a:t>is required</a:t>
-            </a:r>
-            <a:r>
-              <a:rPr lang="en-US" sz="3200" dirty="0" smtClean="0"/>
-              <a:t> </a:t>
-            </a:r>
-            <a:endParaRPr lang="en-US" sz="3200" dirty="0" smtClean="0"/>
+              <a:t>Images available, but no performer image processing is required </a:t>
+            </a:r>
           </a:p>
           <a:p>
             <a:endParaRPr lang="en-US" sz="3200" b="1" dirty="0"/>
@@ -3782,35 +3745,7 @@
           <a:p>
             <a:r>
               <a:rPr lang="en-US" sz="3200" b="1" dirty="0" smtClean="0"/>
-              <a:t>Round </a:t>
-            </a:r>
-            <a:r>
-              <a:rPr lang="en-US" sz="3200" b="1" dirty="0" smtClean="0"/>
-              <a:t>2 </a:t>
-            </a:r>
-            <a:r>
-              <a:rPr lang="en-US" sz="3200" b="1" dirty="0" smtClean="0"/>
-              <a:t>(presented </a:t>
-            </a:r>
-            <a:r>
-              <a:rPr lang="en-US" sz="3200" b="1" dirty="0" smtClean="0"/>
-              <a:t>January 2016, </a:t>
-            </a:r>
-            <a:r>
-              <a:rPr lang="en-US" sz="3200" b="1" dirty="0" smtClean="0"/>
-              <a:t>evaluated </a:t>
-            </a:r>
-            <a:r>
-              <a:rPr lang="en-US" sz="3200" b="1" dirty="0" smtClean="0"/>
-              <a:t>July </a:t>
-            </a:r>
-            <a:r>
-              <a:rPr lang="en-US" sz="3200" b="1" dirty="0" smtClean="0"/>
-              <a:t>2016</a:t>
-            </a:r>
-            <a:r>
-              <a:rPr lang="en-US" sz="3200" b="1" dirty="0" smtClean="0"/>
-              <a:t>):</a:t>
+              <a:t>Round 2 (presented January 2016, evaluated July 2016):</a:t>
             </a:r>
           </a:p>
           <a:p>
@@ -4203,11 +4138,7 @@
             </a:r>
             <a:r>
               <a:rPr lang="en-US" sz="2800" dirty="0" smtClean="0"/>
-              <a:t> retrieval evaluation,” CIVR, </a:t>
-            </a:r>
-            <a:r>
-              <a:rPr lang="en-US" sz="2800" dirty="0" smtClean="0"/>
-              <a:t>2008</a:t>
+              <a:t> retrieval evaluation,” CIVR, 2008</a:t>
             </a:r>
           </a:p>
           <a:p>
@@ -4230,17 +4161,8 @@
             </a:r>
             <a:r>
               <a:rPr lang="en-US" sz="2800" dirty="0" smtClean="0"/>
-              <a:t>, Image Labeling on a Network: Using </a:t>
-            </a:r>
-            <a:r>
-              <a:rPr lang="en-US" sz="2800" dirty="0" smtClean="0"/>
-              <a:t>Social-Network </a:t>
-            </a:r>
-            <a:r>
-              <a:rPr lang="en-US" sz="2800" dirty="0" smtClean="0"/>
-              <a:t>Metadata for Image Classification, in ECCV 2012</a:t>
-            </a:r>
-            <a:endParaRPr lang="en-US" sz="2800" dirty="0" smtClean="0"/>
+              <a:t>, Image Labeling on a Network: Using Social-Network Metadata for Image Classification, in ECCV 2012</a:t>
+            </a:r>
           </a:p>
           <a:p>
             <a:endParaRPr lang="en-US" sz="3200" b="1" dirty="0"/>
@@ -5854,11 +5776,15 @@
           <a:p>
             <a:r>
               <a:rPr lang="en-US" sz="3200" dirty="0" smtClean="0"/>
-              <a:t>A Conditional Random Field (CRF) will be used as a baseline model due to its natural ability to model dependencies between pairs of labels while being conditioned </a:t>
+              <a:t>A Conditional Random Field (CRF) will be used as </a:t>
+            </a:r>
+            <a:r>
+              <a:rPr lang="en-US" sz="3200" smtClean="0"/>
+              <a:t>a probability model </a:t>
             </a:r>
             <a:r>
               <a:rPr lang="en-US" sz="3200" dirty="0" smtClean="0"/>
-              <a:t>on the input image. We will also compare against </a:t>
+              <a:t>due to its natural ability to model dependencies between pairs of labels while being conditioned on the input image. We will also compare against </a:t>
             </a:r>
             <a:r>
               <a:rPr lang="en-US" sz="3200" dirty="0" err="1" smtClean="0"/>
@@ -6128,7 +6054,7 @@
     </p:spTree>
     <p:extLst>
       <p:ext uri="{BB962C8B-B14F-4D97-AF65-F5344CB8AC3E}">
-        <p14:creationId xmlns:p14="http://schemas.microsoft.com/office/powerpoint/2010/main" xmlns="" val="3145607425"/>
+        <p14:creationId xmlns="" xmlns:p14="http://schemas.microsoft.com/office/powerpoint/2010/main" val="3145607425"/>
       </p:ext>
     </p:extLst>
   </p:cSld>

</xml_diff>

<commit_message>
Update poster with new test/train split counts
</commit_message>
<xml_diff>
--- a/problem_statement/KW-cp6-poster-draft.pptx
+++ b/problem_statement/KW-cp6-poster-draft.pptx
@@ -289,7 +289,7 @@
             <a:fld id="{91E52B59-04F6-C14B-88DF-2A7E1C5088F2}" type="datetimeFigureOut">
               <a:rPr lang="en-US" smtClean="0"/>
               <a:pPr/>
-              <a:t>7/6/2015</a:t>
+              <a:t>7/9/2015</a:t>
             </a:fld>
             <a:endParaRPr lang="en-US"/>
           </a:p>
@@ -341,7 +341,7 @@
     </p:spTree>
     <p:extLst>
       <p:ext uri="{BB962C8B-B14F-4D97-AF65-F5344CB8AC3E}">
-        <p14:creationId xmlns="" xmlns:p14="http://schemas.microsoft.com/office/powerpoint/2010/main" val="3284330639"/>
+        <p14:creationId xmlns:p14="http://schemas.microsoft.com/office/powerpoint/2010/main" xmlns="" val="3284330639"/>
       </p:ext>
     </p:extLst>
   </p:cSld>
@@ -461,7 +461,7 @@
             <a:fld id="{91E52B59-04F6-C14B-88DF-2A7E1C5088F2}" type="datetimeFigureOut">
               <a:rPr lang="en-US" smtClean="0"/>
               <a:pPr/>
-              <a:t>7/6/2015</a:t>
+              <a:t>7/9/2015</a:t>
             </a:fld>
             <a:endParaRPr lang="en-US"/>
           </a:p>
@@ -513,7 +513,7 @@
     </p:spTree>
     <p:extLst>
       <p:ext uri="{BB962C8B-B14F-4D97-AF65-F5344CB8AC3E}">
-        <p14:creationId xmlns="" xmlns:p14="http://schemas.microsoft.com/office/powerpoint/2010/main" val="2028544917"/>
+        <p14:creationId xmlns:p14="http://schemas.microsoft.com/office/powerpoint/2010/main" xmlns="" val="2028544917"/>
       </p:ext>
     </p:extLst>
   </p:cSld>
@@ -643,7 +643,7 @@
             <a:fld id="{91E52B59-04F6-C14B-88DF-2A7E1C5088F2}" type="datetimeFigureOut">
               <a:rPr lang="en-US" smtClean="0"/>
               <a:pPr/>
-              <a:t>7/6/2015</a:t>
+              <a:t>7/9/2015</a:t>
             </a:fld>
             <a:endParaRPr lang="en-US"/>
           </a:p>
@@ -695,7 +695,7 @@
     </p:spTree>
     <p:extLst>
       <p:ext uri="{BB962C8B-B14F-4D97-AF65-F5344CB8AC3E}">
-        <p14:creationId xmlns="" xmlns:p14="http://schemas.microsoft.com/office/powerpoint/2010/main" val="3000910633"/>
+        <p14:creationId xmlns:p14="http://schemas.microsoft.com/office/powerpoint/2010/main" xmlns="" val="3000910633"/>
       </p:ext>
     </p:extLst>
   </p:cSld>
@@ -815,7 +815,7 @@
             <a:fld id="{91E52B59-04F6-C14B-88DF-2A7E1C5088F2}" type="datetimeFigureOut">
               <a:rPr lang="en-US" smtClean="0"/>
               <a:pPr/>
-              <a:t>7/6/2015</a:t>
+              <a:t>7/9/2015</a:t>
             </a:fld>
             <a:endParaRPr lang="en-US"/>
           </a:p>
@@ -867,7 +867,7 @@
     </p:spTree>
     <p:extLst>
       <p:ext uri="{BB962C8B-B14F-4D97-AF65-F5344CB8AC3E}">
-        <p14:creationId xmlns="" xmlns:p14="http://schemas.microsoft.com/office/powerpoint/2010/main" val="3688294867"/>
+        <p14:creationId xmlns:p14="http://schemas.microsoft.com/office/powerpoint/2010/main" xmlns="" val="3688294867"/>
       </p:ext>
     </p:extLst>
   </p:cSld>
@@ -1063,7 +1063,7 @@
             <a:fld id="{91E52B59-04F6-C14B-88DF-2A7E1C5088F2}" type="datetimeFigureOut">
               <a:rPr lang="en-US" smtClean="0"/>
               <a:pPr/>
-              <a:t>7/6/2015</a:t>
+              <a:t>7/9/2015</a:t>
             </a:fld>
             <a:endParaRPr lang="en-US"/>
           </a:p>
@@ -1115,7 +1115,7 @@
     </p:spTree>
     <p:extLst>
       <p:ext uri="{BB962C8B-B14F-4D97-AF65-F5344CB8AC3E}">
-        <p14:creationId xmlns="" xmlns:p14="http://schemas.microsoft.com/office/powerpoint/2010/main" val="2957209384"/>
+        <p14:creationId xmlns:p14="http://schemas.microsoft.com/office/powerpoint/2010/main" xmlns="" val="2957209384"/>
       </p:ext>
     </p:extLst>
   </p:cSld>
@@ -1353,7 +1353,7 @@
             <a:fld id="{91E52B59-04F6-C14B-88DF-2A7E1C5088F2}" type="datetimeFigureOut">
               <a:rPr lang="en-US" smtClean="0"/>
               <a:pPr/>
-              <a:t>7/6/2015</a:t>
+              <a:t>7/9/2015</a:t>
             </a:fld>
             <a:endParaRPr lang="en-US"/>
           </a:p>
@@ -1405,7 +1405,7 @@
     </p:spTree>
     <p:extLst>
       <p:ext uri="{BB962C8B-B14F-4D97-AF65-F5344CB8AC3E}">
-        <p14:creationId xmlns="" xmlns:p14="http://schemas.microsoft.com/office/powerpoint/2010/main" val="4125405752"/>
+        <p14:creationId xmlns:p14="http://schemas.microsoft.com/office/powerpoint/2010/main" xmlns="" val="4125405752"/>
       </p:ext>
     </p:extLst>
   </p:cSld>
@@ -1777,7 +1777,7 @@
             <a:fld id="{91E52B59-04F6-C14B-88DF-2A7E1C5088F2}" type="datetimeFigureOut">
               <a:rPr lang="en-US" smtClean="0"/>
               <a:pPr/>
-              <a:t>7/6/2015</a:t>
+              <a:t>7/9/2015</a:t>
             </a:fld>
             <a:endParaRPr lang="en-US"/>
           </a:p>
@@ -1829,7 +1829,7 @@
     </p:spTree>
     <p:extLst>
       <p:ext uri="{BB962C8B-B14F-4D97-AF65-F5344CB8AC3E}">
-        <p14:creationId xmlns="" xmlns:p14="http://schemas.microsoft.com/office/powerpoint/2010/main" val="2945653664"/>
+        <p14:creationId xmlns:p14="http://schemas.microsoft.com/office/powerpoint/2010/main" xmlns="" val="2945653664"/>
       </p:ext>
     </p:extLst>
   </p:cSld>
@@ -1897,7 +1897,7 @@
             <a:fld id="{91E52B59-04F6-C14B-88DF-2A7E1C5088F2}" type="datetimeFigureOut">
               <a:rPr lang="en-US" smtClean="0"/>
               <a:pPr/>
-              <a:t>7/6/2015</a:t>
+              <a:t>7/9/2015</a:t>
             </a:fld>
             <a:endParaRPr lang="en-US"/>
           </a:p>
@@ -1949,7 +1949,7 @@
     </p:spTree>
     <p:extLst>
       <p:ext uri="{BB962C8B-B14F-4D97-AF65-F5344CB8AC3E}">
-        <p14:creationId xmlns="" xmlns:p14="http://schemas.microsoft.com/office/powerpoint/2010/main" val="4207284367"/>
+        <p14:creationId xmlns:p14="http://schemas.microsoft.com/office/powerpoint/2010/main" xmlns="" val="4207284367"/>
       </p:ext>
     </p:extLst>
   </p:cSld>
@@ -1994,7 +1994,7 @@
             <a:fld id="{91E52B59-04F6-C14B-88DF-2A7E1C5088F2}" type="datetimeFigureOut">
               <a:rPr lang="en-US" smtClean="0"/>
               <a:pPr/>
-              <a:t>7/6/2015</a:t>
+              <a:t>7/9/2015</a:t>
             </a:fld>
             <a:endParaRPr lang="en-US"/>
           </a:p>
@@ -2046,7 +2046,7 @@
     </p:spTree>
     <p:extLst>
       <p:ext uri="{BB962C8B-B14F-4D97-AF65-F5344CB8AC3E}">
-        <p14:creationId xmlns="" xmlns:p14="http://schemas.microsoft.com/office/powerpoint/2010/main" val="1962708010"/>
+        <p14:creationId xmlns:p14="http://schemas.microsoft.com/office/powerpoint/2010/main" xmlns="" val="1962708010"/>
       </p:ext>
     </p:extLst>
   </p:cSld>
@@ -2273,7 +2273,7 @@
             <a:fld id="{91E52B59-04F6-C14B-88DF-2A7E1C5088F2}" type="datetimeFigureOut">
               <a:rPr lang="en-US" smtClean="0"/>
               <a:pPr/>
-              <a:t>7/6/2015</a:t>
+              <a:t>7/9/2015</a:t>
             </a:fld>
             <a:endParaRPr lang="en-US"/>
           </a:p>
@@ -2325,7 +2325,7 @@
     </p:spTree>
     <p:extLst>
       <p:ext uri="{BB962C8B-B14F-4D97-AF65-F5344CB8AC3E}">
-        <p14:creationId xmlns="" xmlns:p14="http://schemas.microsoft.com/office/powerpoint/2010/main" val="1293177147"/>
+        <p14:creationId xmlns:p14="http://schemas.microsoft.com/office/powerpoint/2010/main" xmlns="" val="1293177147"/>
       </p:ext>
     </p:extLst>
   </p:cSld>
@@ -2528,7 +2528,7 @@
             <a:fld id="{91E52B59-04F6-C14B-88DF-2A7E1C5088F2}" type="datetimeFigureOut">
               <a:rPr lang="en-US" smtClean="0"/>
               <a:pPr/>
-              <a:t>7/6/2015</a:t>
+              <a:t>7/9/2015</a:t>
             </a:fld>
             <a:endParaRPr lang="en-US"/>
           </a:p>
@@ -2580,7 +2580,7 @@
     </p:spTree>
     <p:extLst>
       <p:ext uri="{BB962C8B-B14F-4D97-AF65-F5344CB8AC3E}">
-        <p14:creationId xmlns="" xmlns:p14="http://schemas.microsoft.com/office/powerpoint/2010/main" val="1720763215"/>
+        <p14:creationId xmlns:p14="http://schemas.microsoft.com/office/powerpoint/2010/main" xmlns="" val="1720763215"/>
       </p:ext>
     </p:extLst>
   </p:cSld>
@@ -2743,7 +2743,7 @@
             <a:fld id="{91E52B59-04F6-C14B-88DF-2A7E1C5088F2}" type="datetimeFigureOut">
               <a:rPr lang="en-US" smtClean="0"/>
               <a:pPr/>
-              <a:t>7/6/2015</a:t>
+              <a:t>7/9/2015</a:t>
             </a:fld>
             <a:endParaRPr lang="en-US"/>
           </a:p>
@@ -2831,7 +2831,7 @@
     </p:spTree>
     <p:extLst>
       <p:ext uri="{BB962C8B-B14F-4D97-AF65-F5344CB8AC3E}">
-        <p14:creationId xmlns="" xmlns:p14="http://schemas.microsoft.com/office/powerpoint/2010/main" val="761185042"/>
+        <p14:creationId xmlns:p14="http://schemas.microsoft.com/office/powerpoint/2010/main" xmlns="" val="761185042"/>
       </p:ext>
     </p:extLst>
   </p:cSld>
@@ -3724,19 +3724,27 @@
             </a:r>
             <a:r>
               <a:rPr lang="en-US" sz="3200" b="1" dirty="0" smtClean="0"/>
-              <a:t>3345</a:t>
+              <a:t>5216</a:t>
             </a:r>
             <a:r>
               <a:rPr lang="en-US" sz="3200" dirty="0" smtClean="0"/>
-              <a:t> images for training, </a:t>
+              <a:t> </a:t>
+            </a:r>
+            <a:r>
+              <a:rPr lang="en-US" sz="3200" dirty="0" smtClean="0"/>
+              <a:t>images for training, </a:t>
             </a:r>
             <a:r>
               <a:rPr lang="en-US" sz="3200" b="1" dirty="0" smtClean="0"/>
-              <a:t>4123</a:t>
+              <a:t>2252</a:t>
             </a:r>
             <a:r>
               <a:rPr lang="en-US" sz="3200" dirty="0" smtClean="0"/>
-              <a:t> for testing</a:t>
+              <a:t> </a:t>
+            </a:r>
+            <a:r>
+              <a:rPr lang="en-US" sz="3200" dirty="0" smtClean="0"/>
+              <a:t>for testing</a:t>
             </a:r>
           </a:p>
           <a:p>
@@ -3751,23 +3759,43 @@
           <a:p>
             <a:r>
               <a:rPr lang="en-US" sz="3200" dirty="0" smtClean="0"/>
-              <a:t>Round 1 data plus images tagged “structure”: total </a:t>
+              <a:t>Round 1 data plus </a:t>
+            </a:r>
+            <a:r>
+              <a:rPr lang="en-US" sz="3200" dirty="0" smtClean="0"/>
+              <a:t>5421 images </a:t>
+            </a:r>
+            <a:r>
+              <a:rPr lang="en-US" sz="3200" dirty="0" smtClean="0"/>
+              <a:t>tagged “structure”: total </a:t>
             </a:r>
             <a:r>
               <a:rPr lang="en-US" sz="3200" b="1" dirty="0" smtClean="0"/>
-              <a:t>5619</a:t>
+              <a:t>9182</a:t>
             </a:r>
             <a:r>
               <a:rPr lang="en-US" sz="3200" dirty="0" smtClean="0"/>
-              <a:t> training, </a:t>
-            </a:r>
-            <a:r>
-              <a:rPr lang="en-US" sz="3200" b="1" dirty="0" smtClean="0"/>
-              <a:t>7270</a:t>
+              <a:t> </a:t>
             </a:r>
             <a:r>
               <a:rPr lang="en-US" sz="3200" dirty="0" smtClean="0"/>
-              <a:t> for testing</a:t>
+              <a:t>training</a:t>
+            </a:r>
+            <a:r>
+              <a:rPr lang="en-US" sz="3200" smtClean="0"/>
+              <a:t>, </a:t>
+            </a:r>
+            <a:r>
+              <a:rPr lang="en-US" sz="3200" b="1" smtClean="0"/>
+              <a:t>3707</a:t>
+            </a:r>
+            <a:r>
+              <a:rPr lang="en-US" sz="3200" smtClean="0"/>
+              <a:t> </a:t>
+            </a:r>
+            <a:r>
+              <a:rPr lang="en-US" sz="3200" dirty="0" smtClean="0"/>
+              <a:t>for testing</a:t>
             </a:r>
           </a:p>
           <a:p>
@@ -5776,15 +5804,7 @@
           <a:p>
             <a:r>
               <a:rPr lang="en-US" sz="3200" dirty="0" smtClean="0"/>
-              <a:t>A Conditional Random Field (CRF) will be used as </a:t>
-            </a:r>
-            <a:r>
-              <a:rPr lang="en-US" sz="3200" smtClean="0"/>
-              <a:t>a probability model </a:t>
-            </a:r>
-            <a:r>
-              <a:rPr lang="en-US" sz="3200" dirty="0" smtClean="0"/>
-              <a:t>due to its natural ability to model dependencies between pairs of labels while being conditioned on the input image. We will also compare against </a:t>
+              <a:t>A Conditional Random Field (CRF) will be used as a probability model due to its natural ability to model dependencies between pairs of labels while being conditioned on the input image. We will also compare against </a:t>
             </a:r>
             <a:r>
               <a:rPr lang="en-US" sz="3200" dirty="0" err="1" smtClean="0"/>
@@ -6054,7 +6074,7 @@
     </p:spTree>
     <p:extLst>
       <p:ext uri="{BB962C8B-B14F-4D97-AF65-F5344CB8AC3E}">
-        <p14:creationId xmlns="" xmlns:p14="http://schemas.microsoft.com/office/powerpoint/2010/main" val="3145607425"/>
+        <p14:creationId xmlns:p14="http://schemas.microsoft.com/office/powerpoint/2010/main" xmlns="" val="3145607425"/>
       </p:ext>
     </p:extLst>
   </p:cSld>

</xml_diff>